<commit_message>
office hours, wed session
</commit_message>
<xml_diff>
--- a/Lectures/Lecture5-ModelSelection.pptx
+++ b/Lectures/Lecture5-ModelSelection.pptx
@@ -11,34 +11,34 @@
   <p:sldIdLst>
     <p:sldId id="256" r:id="rId3"/>
     <p:sldId id="477" r:id="rId4"/>
-    <p:sldId id="486" r:id="rId5"/>
-    <p:sldId id="323" r:id="rId6"/>
-    <p:sldId id="286" r:id="rId7"/>
-    <p:sldId id="472" r:id="rId8"/>
-    <p:sldId id="287" r:id="rId9"/>
-    <p:sldId id="478" r:id="rId10"/>
-    <p:sldId id="468" r:id="rId11"/>
-    <p:sldId id="473" r:id="rId12"/>
-    <p:sldId id="288" r:id="rId13"/>
-    <p:sldId id="474" r:id="rId14"/>
-    <p:sldId id="297" r:id="rId15"/>
-    <p:sldId id="479" r:id="rId16"/>
-    <p:sldId id="480" r:id="rId17"/>
-    <p:sldId id="481" r:id="rId18"/>
-    <p:sldId id="482" r:id="rId19"/>
-    <p:sldId id="483" r:id="rId20"/>
-    <p:sldId id="487" r:id="rId21"/>
-    <p:sldId id="289" r:id="rId22"/>
-    <p:sldId id="290" r:id="rId23"/>
-    <p:sldId id="291" r:id="rId24"/>
-    <p:sldId id="292" r:id="rId25"/>
-    <p:sldId id="293" r:id="rId26"/>
-    <p:sldId id="469" r:id="rId27"/>
-    <p:sldId id="470" r:id="rId28"/>
-    <p:sldId id="296" r:id="rId29"/>
-    <p:sldId id="454" r:id="rId30"/>
-    <p:sldId id="484" r:id="rId31"/>
-    <p:sldId id="485" r:id="rId32"/>
+    <p:sldId id="281" r:id="rId5"/>
+    <p:sldId id="486" r:id="rId6"/>
+    <p:sldId id="323" r:id="rId7"/>
+    <p:sldId id="286" r:id="rId8"/>
+    <p:sldId id="472" r:id="rId9"/>
+    <p:sldId id="287" r:id="rId10"/>
+    <p:sldId id="478" r:id="rId11"/>
+    <p:sldId id="468" r:id="rId12"/>
+    <p:sldId id="473" r:id="rId13"/>
+    <p:sldId id="288" r:id="rId14"/>
+    <p:sldId id="474" r:id="rId15"/>
+    <p:sldId id="297" r:id="rId16"/>
+    <p:sldId id="479" r:id="rId17"/>
+    <p:sldId id="480" r:id="rId18"/>
+    <p:sldId id="481" r:id="rId19"/>
+    <p:sldId id="482" r:id="rId20"/>
+    <p:sldId id="483" r:id="rId21"/>
+    <p:sldId id="487" r:id="rId22"/>
+    <p:sldId id="289" r:id="rId23"/>
+    <p:sldId id="290" r:id="rId24"/>
+    <p:sldId id="291" r:id="rId25"/>
+    <p:sldId id="292" r:id="rId26"/>
+    <p:sldId id="293" r:id="rId27"/>
+    <p:sldId id="469" r:id="rId28"/>
+    <p:sldId id="470" r:id="rId29"/>
+    <p:sldId id="296" r:id="rId30"/>
+    <p:sldId id="454" r:id="rId31"/>
+    <p:sldId id="484" r:id="rId32"/>
   </p:sldIdLst>
   <p:sldSz cx="12192000" cy="6858000"/>
   <p:notesSz cx="6858000" cy="9144000"/>
@@ -276,7 +276,7 @@
       <p15:sldGuideLst xmlns:p15="http://schemas.microsoft.com/office/powerpoint/2012/main"/>
     </p:ext>
     <p:ext uri="http://customooxmlschemas.google.com/">
-      <go:slidesCustomData xmlns:go="http://customooxmlschemas.google.com/" xmlns:p15="http://schemas.microsoft.com/office/powerpoint/2012/main" xmlns:p14="http://schemas.microsoft.com/office/powerpoint/2010/main" xmlns:com="http://schemas.openxmlformats.org/drawingml/2006/compatibility" xmlns:pvml="urn:schemas-microsoft-com:office:powerpoint" xmlns:v="urn:schemas-microsoft-com:vml" xmlns:o="urn:schemas-microsoft-com:office:office" xmlns:dgm="http://schemas.openxmlformats.org/drawingml/2006/diagram" xmlns:c="http://schemas.openxmlformats.org/drawingml/2006/chart" xmlns:mv="urn:schemas-microsoft-com:mac:vml" xmlns:mc="http://schemas.openxmlformats.org/markup-compatibility/2006" xmlns="" r:id="rId40" roundtripDataSignature="AMtx7mjFyVUGRZWio+dc9dxzYsimUxNJbg=="/>
+      <go:slidesCustomData xmlns="" xmlns:mc="http://schemas.openxmlformats.org/markup-compatibility/2006" xmlns:mv="urn:schemas-microsoft-com:mac:vml" xmlns:c="http://schemas.openxmlformats.org/drawingml/2006/chart" xmlns:dgm="http://schemas.openxmlformats.org/drawingml/2006/diagram" xmlns:o="urn:schemas-microsoft-com:office:office" xmlns:v="urn:schemas-microsoft-com:vml" xmlns:pvml="urn:schemas-microsoft-com:office:powerpoint" xmlns:com="http://schemas.openxmlformats.org/drawingml/2006/compatibility" xmlns:p14="http://schemas.microsoft.com/office/powerpoint/2010/main" xmlns:p15="http://schemas.microsoft.com/office/powerpoint/2012/main" xmlns:go="http://customooxmlschemas.google.com/" r:id="rId40" roundtripDataSignature="AMtx7mjFyVUGRZWio+dc9dxzYsimUxNJbg=="/>
     </p:ext>
   </p:extLst>
 </p:presentation>
@@ -7331,7 +7331,7 @@
           <a:p>
             <a:fld id="{7C0312F8-2DE2-6B40-83C5-731724CAE2B0}" type="datetimeFigureOut">
               <a:rPr lang="en-US" smtClean="0"/>
-              <a:t>9/13/21</a:t>
+              <a:t>9/14/21</a:t>
             </a:fld>
             <a:endParaRPr lang="en-US"/>
           </a:p>
@@ -7426,7 +7426,7 @@
           <a:p>
             <a:fld id="{7C0312F8-2DE2-6B40-83C5-731724CAE2B0}" type="datetimeFigureOut">
               <a:rPr lang="en-US" smtClean="0"/>
-              <a:t>9/13/21</a:t>
+              <a:t>9/14/21</a:t>
             </a:fld>
             <a:endParaRPr lang="en-US"/>
           </a:p>
@@ -9418,7 +9418,7 @@
           <a:p>
             <a:fld id="{7C0312F8-2DE2-6B40-83C5-731724CAE2B0}" type="datetimeFigureOut">
               <a:rPr lang="en-US" smtClean="0"/>
-              <a:t>9/13/21</a:t>
+              <a:t>9/14/21</a:t>
             </a:fld>
             <a:endParaRPr lang="en-US"/>
           </a:p>
@@ -9703,7 +9703,7 @@
           <a:p>
             <a:fld id="{7C0312F8-2DE2-6B40-83C5-731724CAE2B0}" type="datetimeFigureOut">
               <a:rPr lang="en-US" smtClean="0"/>
-              <a:t>9/13/21</a:t>
+              <a:t>9/14/21</a:t>
             </a:fld>
             <a:endParaRPr lang="en-US"/>
           </a:p>
@@ -11180,7 +11180,7 @@
           <a:p>
             <a:fld id="{7C0312F8-2DE2-6B40-83C5-731724CAE2B0}" type="datetimeFigureOut">
               <a:rPr lang="en-US" smtClean="0"/>
-              <a:t>9/13/21</a:t>
+              <a:t>9/14/21</a:t>
             </a:fld>
             <a:endParaRPr lang="en-US"/>
           </a:p>
@@ -11750,6 +11750,134 @@
       </p:grpSpPr>
       <p:sp>
         <p:nvSpPr>
+          <p:cNvPr id="4" name="Title 3">
+            <a:extLst>
+              <a:ext uri="{FF2B5EF4-FFF2-40B4-BE49-F238E27FC236}">
+                <a16:creationId xmlns:a16="http://schemas.microsoft.com/office/drawing/2014/main" id="{30C2C959-72F2-EF4D-80DA-F48A29D0F3C4}"/>
+              </a:ext>
+            </a:extLst>
+          </p:cNvPr>
+          <p:cNvSpPr>
+            <a:spLocks noGrp="1"/>
+          </p:cNvSpPr>
+          <p:nvPr>
+            <p:ph type="title"/>
+          </p:nvPr>
+        </p:nvSpPr>
+        <p:spPr/>
+        <p:txBody>
+          <a:bodyPr/>
+          <a:lstStyle/>
+          <a:p>
+            <a:r>
+              <a:rPr lang="en-US" dirty="0"/>
+              <a:t>What do we need our selected model to do?</a:t>
+            </a:r>
+          </a:p>
+        </p:txBody>
+      </p:sp>
+      <p:sp>
+        <p:nvSpPr>
+          <p:cNvPr id="5" name="Text Placeholder 4">
+            <a:extLst>
+              <a:ext uri="{FF2B5EF4-FFF2-40B4-BE49-F238E27FC236}">
+                <a16:creationId xmlns:a16="http://schemas.microsoft.com/office/drawing/2014/main" id="{24A75FF1-9EFE-0F41-92F5-3E749CFB2EB5}"/>
+              </a:ext>
+            </a:extLst>
+          </p:cNvPr>
+          <p:cNvSpPr>
+            <a:spLocks noGrp="1"/>
+          </p:cNvSpPr>
+          <p:nvPr>
+            <p:ph type="body" idx="1"/>
+          </p:nvPr>
+        </p:nvSpPr>
+        <p:spPr/>
+        <p:txBody>
+          <a:bodyPr/>
+          <a:lstStyle/>
+          <a:p>
+            <a:r>
+              <a:rPr lang="en-US" dirty="0"/>
+              <a:t>Perform well</a:t>
+            </a:r>
+          </a:p>
+          <a:p>
+            <a:pPr lvl="1"/>
+            <a:r>
+              <a:rPr lang="en-US" dirty="0"/>
+              <a:t>What metric?</a:t>
+            </a:r>
+          </a:p>
+          <a:p>
+            <a:pPr lvl="1"/>
+            <a:r>
+              <a:rPr lang="en-US" dirty="0"/>
+              <a:t>Compared to what?</a:t>
+            </a:r>
+          </a:p>
+          <a:p>
+            <a:endParaRPr lang="en-US" dirty="0"/>
+          </a:p>
+          <a:p>
+            <a:r>
+              <a:rPr lang="en-US" dirty="0"/>
+              <a:t>Generalize</a:t>
+            </a:r>
+          </a:p>
+          <a:p>
+            <a:pPr lvl="1"/>
+            <a:r>
+              <a:rPr lang="en-US" dirty="0"/>
+              <a:t>To what?</a:t>
+            </a:r>
+          </a:p>
+        </p:txBody>
+      </p:sp>
+    </p:spTree>
+    <p:extLst>
+      <p:ext uri="{BB962C8B-B14F-4D97-AF65-F5344CB8AC3E}">
+        <p14:creationId xmlns:p14="http://schemas.microsoft.com/office/powerpoint/2010/main" val="4111643116"/>
+      </p:ext>
+    </p:extLst>
+  </p:cSld>
+  <p:clrMapOvr>
+    <a:masterClrMapping/>
+  </p:clrMapOvr>
+  <mc:AlternateContent xmlns:mc="http://schemas.openxmlformats.org/markup-compatibility/2006" xmlns:p14="http://schemas.microsoft.com/office/powerpoint/2010/main">
+    <mc:Choice Requires="p14">
+      <p:transition spd="med" p14:dur="700">
+        <p:fade/>
+      </p:transition>
+    </mc:Choice>
+    <mc:Fallback xmlns="">
+      <p:transition spd="med">
+        <p:fade/>
+      </p:transition>
+    </mc:Fallback>
+  </mc:AlternateContent>
+</p:sld>
+</file>
+
+<file path=ppt/slides/slide11.xml><?xml version="1.0" encoding="utf-8"?>
+<p:sld xmlns:a="http://schemas.openxmlformats.org/drawingml/2006/main" xmlns:r="http://schemas.openxmlformats.org/officeDocument/2006/relationships" xmlns:p="http://schemas.openxmlformats.org/presentationml/2006/main">
+  <p:cSld>
+    <p:spTree>
+      <p:nvGrpSpPr>
+        <p:cNvPr id="1" name=""/>
+        <p:cNvGrpSpPr/>
+        <p:nvPr/>
+      </p:nvGrpSpPr>
+      <p:grpSpPr>
+        <a:xfrm>
+          <a:off x="0" y="0"/>
+          <a:ext cx="0" cy="0"/>
+          <a:chOff x="0" y="0"/>
+          <a:chExt cx="0" cy="0"/>
+        </a:xfrm>
+      </p:grpSpPr>
+      <p:sp>
+        <p:nvSpPr>
           <p:cNvPr id="2" name="Title 1">
             <a:extLst>
               <a:ext uri="{FF2B5EF4-FFF2-40B4-BE49-F238E27FC236}">
@@ -11814,7 +11942,7 @@
 </p:sld>
 </file>
 
-<file path=ppt/slides/slide11.xml><?xml version="1.0" encoding="utf-8"?>
+<file path=ppt/slides/slide12.xml><?xml version="1.0" encoding="utf-8"?>
 <p:sld xmlns:a="http://schemas.openxmlformats.org/drawingml/2006/main" xmlns:r="http://schemas.openxmlformats.org/officeDocument/2006/relationships" xmlns:p="http://schemas.openxmlformats.org/presentationml/2006/main">
   <p:cSld>
     <p:spTree>
@@ -11911,7 +12039,7 @@
 </p:sld>
 </file>
 
-<file path=ppt/slides/slide12.xml><?xml version="1.0" encoding="utf-8"?>
+<file path=ppt/slides/slide13.xml><?xml version="1.0" encoding="utf-8"?>
 <p:sld xmlns:a="http://schemas.openxmlformats.org/drawingml/2006/main" xmlns:r="http://schemas.openxmlformats.org/officeDocument/2006/relationships" xmlns:p="http://schemas.openxmlformats.org/presentationml/2006/main">
   <p:cSld>
     <p:spTree>
@@ -11994,7 +12122,7 @@
 </p:sld>
 </file>
 
-<file path=ppt/slides/slide13.xml><?xml version="1.0" encoding="utf-8"?>
+<file path=ppt/slides/slide14.xml><?xml version="1.0" encoding="utf-8"?>
 <p:sld xmlns:a="http://schemas.openxmlformats.org/drawingml/2006/main" xmlns:r="http://schemas.openxmlformats.org/officeDocument/2006/relationships" xmlns:p="http://schemas.openxmlformats.org/presentationml/2006/main">
   <p:cSld>
     <p:spTree>
@@ -12111,140 +12239,6 @@
     <p:extLst>
       <p:ext uri="{BB962C8B-B14F-4D97-AF65-F5344CB8AC3E}">
         <p14:creationId xmlns:p14="http://schemas.microsoft.com/office/powerpoint/2010/main" val="4093726934"/>
-      </p:ext>
-    </p:extLst>
-  </p:cSld>
-  <p:clrMapOvr>
-    <a:masterClrMapping/>
-  </p:clrMapOvr>
-</p:sld>
-</file>
-
-<file path=ppt/slides/slide14.xml><?xml version="1.0" encoding="utf-8"?>
-<p:sld xmlns:a="http://schemas.openxmlformats.org/drawingml/2006/main" xmlns:r="http://schemas.openxmlformats.org/officeDocument/2006/relationships" xmlns:p="http://schemas.openxmlformats.org/presentationml/2006/main">
-  <p:cSld>
-    <p:spTree>
-      <p:nvGrpSpPr>
-        <p:cNvPr id="1" name=""/>
-        <p:cNvGrpSpPr/>
-        <p:nvPr/>
-      </p:nvGrpSpPr>
-      <p:grpSpPr>
-        <a:xfrm>
-          <a:off x="0" y="0"/>
-          <a:ext cx="0" cy="0"/>
-          <a:chOff x="0" y="0"/>
-          <a:chExt cx="0" cy="0"/>
-        </a:xfrm>
-      </p:grpSpPr>
-      <p:sp>
-        <p:nvSpPr>
-          <p:cNvPr id="2" name="Title 1">
-            <a:extLst>
-              <a:ext uri="{FF2B5EF4-FFF2-40B4-BE49-F238E27FC236}">
-                <a16:creationId xmlns:a16="http://schemas.microsoft.com/office/drawing/2014/main" id="{D78147EA-4092-034E-8792-847E37175401}"/>
-              </a:ext>
-            </a:extLst>
-          </p:cNvPr>
-          <p:cNvSpPr>
-            <a:spLocks noGrp="1"/>
-          </p:cNvSpPr>
-          <p:nvPr>
-            <p:ph type="title"/>
-          </p:nvPr>
-        </p:nvSpPr>
-        <p:spPr/>
-        <p:txBody>
-          <a:bodyPr/>
-          <a:lstStyle/>
-          <a:p>
-            <a:r>
-              <a:rPr lang="en-US" dirty="0"/>
-              <a:t>Scenarios</a:t>
-            </a:r>
-          </a:p>
-        </p:txBody>
-      </p:sp>
-      <p:sp>
-        <p:nvSpPr>
-          <p:cNvPr id="3" name="Text Placeholder 2">
-            <a:extLst>
-              <a:ext uri="{FF2B5EF4-FFF2-40B4-BE49-F238E27FC236}">
-                <a16:creationId xmlns:a16="http://schemas.microsoft.com/office/drawing/2014/main" id="{3B207A3F-596E-1542-A461-8EE389BA1A43}"/>
-              </a:ext>
-            </a:extLst>
-          </p:cNvPr>
-          <p:cNvSpPr>
-            <a:spLocks noGrp="1"/>
-          </p:cNvSpPr>
-          <p:nvPr>
-            <p:ph type="body" idx="1"/>
-          </p:nvPr>
-        </p:nvSpPr>
-        <p:spPr/>
-        <p:txBody>
-          <a:bodyPr/>
-          <a:lstStyle/>
-          <a:p>
-            <a:pPr marL="76200" indent="0">
-              <a:buNone/>
-            </a:pPr>
-            <a:r>
-              <a:rPr lang="en-US" dirty="0"/>
-              <a:t>1: We want to track news coverage of epidemic related topics. We have tagged a small corpus (n=1000) of news articles from Jan 2019 to September 2020 and now have a stream of new incoming articles every day. We want to deploy a system that tracks the intensity of coverage by media outlet going forward.</a:t>
-            </a:r>
-          </a:p>
-          <a:p>
-            <a:pPr marL="76200" indent="0">
-              <a:buNone/>
-            </a:pPr>
-            <a:endParaRPr lang="en-US" dirty="0"/>
-          </a:p>
-          <a:p>
-            <a:pPr marL="76200" indent="0">
-              <a:buNone/>
-            </a:pPr>
-            <a:r>
-              <a:rPr lang="en-US" dirty="0"/>
-              <a:t>What should our model generalize to?</a:t>
-            </a:r>
-          </a:p>
-          <a:p>
-            <a:pPr marL="76200" indent="0">
-              <a:buNone/>
-            </a:pPr>
-            <a:endParaRPr lang="en-US" dirty="0"/>
-          </a:p>
-          <a:p>
-            <a:pPr marL="76200" indent="0">
-              <a:buNone/>
-            </a:pPr>
-            <a:r>
-              <a:rPr lang="en-US" dirty="0"/>
-              <a:t>What is a training set?</a:t>
-            </a:r>
-          </a:p>
-          <a:p>
-            <a:pPr marL="76200" indent="0">
-              <a:buNone/>
-            </a:pPr>
-            <a:endParaRPr lang="en-US" dirty="0"/>
-          </a:p>
-          <a:p>
-            <a:pPr marL="76200" indent="0">
-              <a:buNone/>
-            </a:pPr>
-            <a:r>
-              <a:rPr lang="en-US" dirty="0"/>
-              <a:t>What is the corresponding validation set?</a:t>
-            </a:r>
-          </a:p>
-        </p:txBody>
-      </p:sp>
-    </p:spTree>
-    <p:extLst>
-      <p:ext uri="{BB962C8B-B14F-4D97-AF65-F5344CB8AC3E}">
-        <p14:creationId xmlns:p14="http://schemas.microsoft.com/office/powerpoint/2010/main" val="1096452247"/>
       </p:ext>
     </p:extLst>
   </p:cSld>
@@ -12325,7 +12319,7 @@
             </a:pPr>
             <a:r>
               <a:rPr lang="en-US" dirty="0"/>
-              <a:t>2: We want to track news coverage of epidemic related topics. We have tagged a small corpus (n=1000) of news articles from Jan 2019 to September 2020 and now have a stream of new incoming articles every day. We want to deploy a system that tracks intensity of coverage by media outlet over the last 2 years as well as going forward.</a:t>
+              <a:t>1: We want to track news coverage of epidemic related topics. We have tagged a small corpus (n=1000) of news articles from Jan 2019 to September 2020 and now have a stream of new incoming articles every day. We want to deploy a system that tracks the intensity of coverage by media outlet going forward.</a:t>
             </a:r>
           </a:p>
           <a:p>
@@ -12378,7 +12372,7 @@
     </p:spTree>
     <p:extLst>
       <p:ext uri="{BB962C8B-B14F-4D97-AF65-F5344CB8AC3E}">
-        <p14:creationId xmlns:p14="http://schemas.microsoft.com/office/powerpoint/2010/main" val="1074433782"/>
+        <p14:creationId xmlns:p14="http://schemas.microsoft.com/office/powerpoint/2010/main" val="1096452247"/>
       </p:ext>
     </p:extLst>
   </p:cSld>
@@ -12459,14 +12453,8 @@
             </a:pPr>
             <a:r>
               <a:rPr lang="en-US" dirty="0"/>
-              <a:t>3: We want to predict whether there will be an increase in epidemic related articles in the media during the next week. </a:t>
+              <a:t>2: We want to track news coverage of epidemic related topics. We have tagged a small corpus (n=1000) of news articles from Jan 2019 to September 2020 and now have a stream of new incoming articles every day. We want to deploy a system that tracks intensity of coverage by media outlet over the last 2 years as well as going forward.</a:t>
             </a:r>
-          </a:p>
-          <a:p>
-            <a:pPr marL="76200" indent="0">
-              <a:buNone/>
-            </a:pPr>
-            <a:endParaRPr lang="en-US" dirty="0"/>
           </a:p>
           <a:p>
             <a:pPr marL="76200" indent="0">
@@ -12518,7 +12506,7 @@
     </p:spTree>
     <p:extLst>
       <p:ext uri="{BB962C8B-B14F-4D97-AF65-F5344CB8AC3E}">
-        <p14:creationId xmlns:p14="http://schemas.microsoft.com/office/powerpoint/2010/main" val="3999252044"/>
+        <p14:creationId xmlns:p14="http://schemas.microsoft.com/office/powerpoint/2010/main" val="1074433782"/>
       </p:ext>
     </p:extLst>
   </p:cSld>
@@ -12599,6 +12587,146 @@
             </a:pPr>
             <a:r>
               <a:rPr lang="en-US" dirty="0"/>
+              <a:t>3: We want to predict whether there will be an increase in epidemic related articles in the media during the next week. </a:t>
+            </a:r>
+          </a:p>
+          <a:p>
+            <a:pPr marL="76200" indent="0">
+              <a:buNone/>
+            </a:pPr>
+            <a:endParaRPr lang="en-US" dirty="0"/>
+          </a:p>
+          <a:p>
+            <a:pPr marL="76200" indent="0">
+              <a:buNone/>
+            </a:pPr>
+            <a:endParaRPr lang="en-US" dirty="0"/>
+          </a:p>
+          <a:p>
+            <a:pPr marL="76200" indent="0">
+              <a:buNone/>
+            </a:pPr>
+            <a:r>
+              <a:rPr lang="en-US" dirty="0"/>
+              <a:t>What should our model generalize to?</a:t>
+            </a:r>
+          </a:p>
+          <a:p>
+            <a:pPr marL="76200" indent="0">
+              <a:buNone/>
+            </a:pPr>
+            <a:endParaRPr lang="en-US" dirty="0"/>
+          </a:p>
+          <a:p>
+            <a:pPr marL="76200" indent="0">
+              <a:buNone/>
+            </a:pPr>
+            <a:r>
+              <a:rPr lang="en-US" dirty="0"/>
+              <a:t>What is a training set?</a:t>
+            </a:r>
+          </a:p>
+          <a:p>
+            <a:pPr marL="76200" indent="0">
+              <a:buNone/>
+            </a:pPr>
+            <a:endParaRPr lang="en-US" dirty="0"/>
+          </a:p>
+          <a:p>
+            <a:pPr marL="76200" indent="0">
+              <a:buNone/>
+            </a:pPr>
+            <a:r>
+              <a:rPr lang="en-US" dirty="0"/>
+              <a:t>What is the corresponding validation set?</a:t>
+            </a:r>
+          </a:p>
+        </p:txBody>
+      </p:sp>
+    </p:spTree>
+    <p:extLst>
+      <p:ext uri="{BB962C8B-B14F-4D97-AF65-F5344CB8AC3E}">
+        <p14:creationId xmlns:p14="http://schemas.microsoft.com/office/powerpoint/2010/main" val="3999252044"/>
+      </p:ext>
+    </p:extLst>
+  </p:cSld>
+  <p:clrMapOvr>
+    <a:masterClrMapping/>
+  </p:clrMapOvr>
+</p:sld>
+</file>
+
+<file path=ppt/slides/slide18.xml><?xml version="1.0" encoding="utf-8"?>
+<p:sld xmlns:a="http://schemas.openxmlformats.org/drawingml/2006/main" xmlns:r="http://schemas.openxmlformats.org/officeDocument/2006/relationships" xmlns:p="http://schemas.openxmlformats.org/presentationml/2006/main">
+  <p:cSld>
+    <p:spTree>
+      <p:nvGrpSpPr>
+        <p:cNvPr id="1" name=""/>
+        <p:cNvGrpSpPr/>
+        <p:nvPr/>
+      </p:nvGrpSpPr>
+      <p:grpSpPr>
+        <a:xfrm>
+          <a:off x="0" y="0"/>
+          <a:ext cx="0" cy="0"/>
+          <a:chOff x="0" y="0"/>
+          <a:chExt cx="0" cy="0"/>
+        </a:xfrm>
+      </p:grpSpPr>
+      <p:sp>
+        <p:nvSpPr>
+          <p:cNvPr id="2" name="Title 1">
+            <a:extLst>
+              <a:ext uri="{FF2B5EF4-FFF2-40B4-BE49-F238E27FC236}">
+                <a16:creationId xmlns:a16="http://schemas.microsoft.com/office/drawing/2014/main" id="{D78147EA-4092-034E-8792-847E37175401}"/>
+              </a:ext>
+            </a:extLst>
+          </p:cNvPr>
+          <p:cNvSpPr>
+            <a:spLocks noGrp="1"/>
+          </p:cNvSpPr>
+          <p:nvPr>
+            <p:ph type="title"/>
+          </p:nvPr>
+        </p:nvSpPr>
+        <p:spPr/>
+        <p:txBody>
+          <a:bodyPr/>
+          <a:lstStyle/>
+          <a:p>
+            <a:r>
+              <a:rPr lang="en-US" dirty="0"/>
+              <a:t>Scenarios</a:t>
+            </a:r>
+          </a:p>
+        </p:txBody>
+      </p:sp>
+      <p:sp>
+        <p:nvSpPr>
+          <p:cNvPr id="3" name="Text Placeholder 2">
+            <a:extLst>
+              <a:ext uri="{FF2B5EF4-FFF2-40B4-BE49-F238E27FC236}">
+                <a16:creationId xmlns:a16="http://schemas.microsoft.com/office/drawing/2014/main" id="{3B207A3F-596E-1542-A461-8EE389BA1A43}"/>
+              </a:ext>
+            </a:extLst>
+          </p:cNvPr>
+          <p:cNvSpPr>
+            <a:spLocks noGrp="1"/>
+          </p:cNvSpPr>
+          <p:nvPr>
+            <p:ph type="body" idx="1"/>
+          </p:nvPr>
+        </p:nvSpPr>
+        <p:spPr/>
+        <p:txBody>
+          <a:bodyPr/>
+          <a:lstStyle/>
+          <a:p>
+            <a:pPr marL="76200" indent="0">
+              <a:buNone/>
+            </a:pPr>
+            <a:r>
+              <a:rPr lang="en-US" dirty="0"/>
               <a:t>4: We want to predict whether there will be an increase in epidemic related articles in the media during the next month. </a:t>
             </a:r>
           </a:p>
@@ -12668,7 +12796,7 @@
 </p:sld>
 </file>
 
-<file path=ppt/slides/slide18.xml><?xml version="1.0" encoding="utf-8"?>
+<file path=ppt/slides/slide19.xml><?xml version="1.0" encoding="utf-8"?>
 <p:sld xmlns:a="http://schemas.openxmlformats.org/drawingml/2006/main" xmlns:r="http://schemas.openxmlformats.org/officeDocument/2006/relationships" xmlns:p="http://schemas.openxmlformats.org/presentationml/2006/main">
   <p:cSld>
     <p:spTree>
@@ -12742,126 +12870,6 @@
     <p:extLst>
       <p:ext uri="{BB962C8B-B14F-4D97-AF65-F5344CB8AC3E}">
         <p14:creationId xmlns:p14="http://schemas.microsoft.com/office/powerpoint/2010/main" val="3359709114"/>
-      </p:ext>
-    </p:extLst>
-  </p:cSld>
-  <p:clrMapOvr>
-    <a:masterClrMapping/>
-  </p:clrMapOvr>
-</p:sld>
-</file>
-
-<file path=ppt/slides/slide19.xml><?xml version="1.0" encoding="utf-8"?>
-<p:sld xmlns:a="http://schemas.openxmlformats.org/drawingml/2006/main" xmlns:r="http://schemas.openxmlformats.org/officeDocument/2006/relationships" xmlns:p="http://schemas.openxmlformats.org/presentationml/2006/main">
-  <p:cSld>
-    <p:spTree>
-      <p:nvGrpSpPr>
-        <p:cNvPr id="1" name=""/>
-        <p:cNvGrpSpPr/>
-        <p:nvPr/>
-      </p:nvGrpSpPr>
-      <p:grpSpPr>
-        <a:xfrm>
-          <a:off x="0" y="0"/>
-          <a:ext cx="0" cy="0"/>
-          <a:chOff x="0" y="0"/>
-          <a:chExt cx="0" cy="0"/>
-        </a:xfrm>
-      </p:grpSpPr>
-      <p:sp>
-        <p:nvSpPr>
-          <p:cNvPr id="2" name="Title 1">
-            <a:extLst>
-              <a:ext uri="{FF2B5EF4-FFF2-40B4-BE49-F238E27FC236}">
-                <a16:creationId xmlns:a16="http://schemas.microsoft.com/office/drawing/2014/main" id="{8A7AA672-F56C-2F41-B566-750991980C8A}"/>
-              </a:ext>
-            </a:extLst>
-          </p:cNvPr>
-          <p:cNvSpPr>
-            <a:spLocks noGrp="1"/>
-          </p:cNvSpPr>
-          <p:nvPr>
-            <p:ph type="title"/>
-          </p:nvPr>
-        </p:nvSpPr>
-        <p:spPr/>
-        <p:txBody>
-          <a:bodyPr/>
-          <a:lstStyle/>
-          <a:p>
-            <a:r>
-              <a:rPr lang="en-US" dirty="0"/>
-              <a:t>Some tips</a:t>
-            </a:r>
-          </a:p>
-        </p:txBody>
-      </p:sp>
-      <p:sp>
-        <p:nvSpPr>
-          <p:cNvPr id="3" name="Text Placeholder 2">
-            <a:extLst>
-              <a:ext uri="{FF2B5EF4-FFF2-40B4-BE49-F238E27FC236}">
-                <a16:creationId xmlns:a16="http://schemas.microsoft.com/office/drawing/2014/main" id="{95B2F8AE-4F06-1B49-B482-20CE10B4D010}"/>
-              </a:ext>
-            </a:extLst>
-          </p:cNvPr>
-          <p:cNvSpPr>
-            <a:spLocks noGrp="1"/>
-          </p:cNvSpPr>
-          <p:nvPr>
-            <p:ph type="body" idx="1"/>
-          </p:nvPr>
-        </p:nvSpPr>
-        <p:spPr/>
-        <p:txBody>
-          <a:bodyPr/>
-          <a:lstStyle/>
-          <a:p>
-            <a:r>
-              <a:rPr lang="en-US" dirty="0"/>
-              <a:t>Set up validation set(s) to match deployment scenarios (and constraints)</a:t>
-            </a:r>
-          </a:p>
-          <a:p>
-            <a:endParaRPr lang="en-US" dirty="0"/>
-          </a:p>
-          <a:p>
-            <a:r>
-              <a:rPr lang="en-US" dirty="0"/>
-              <a:t>Set up training set(s) any way we want but match data (both features and labels) available at training time</a:t>
-            </a:r>
-          </a:p>
-          <a:p>
-            <a:pPr lvl="1"/>
-            <a:r>
-              <a:rPr lang="en-US" dirty="0"/>
-              <a:t>Making sure labels are not censored based on label period</a:t>
-            </a:r>
-          </a:p>
-          <a:p>
-            <a:pPr lvl="1"/>
-            <a:r>
-              <a:rPr lang="en-US" dirty="0"/>
-              <a:t> Sampling (if helpful)</a:t>
-            </a:r>
-          </a:p>
-          <a:p>
-            <a:pPr lvl="1"/>
-            <a:r>
-              <a:rPr lang="en-US" dirty="0"/>
-              <a:t>Data collection and update lag</a:t>
-            </a:r>
-          </a:p>
-          <a:p>
-            <a:pPr lvl="1"/>
-            <a:endParaRPr lang="en-US" dirty="0"/>
-          </a:p>
-        </p:txBody>
-      </p:sp>
-    </p:spTree>
-    <p:extLst>
-      <p:ext uri="{BB962C8B-B14F-4D97-AF65-F5344CB8AC3E}">
-        <p14:creationId xmlns:p14="http://schemas.microsoft.com/office/powerpoint/2010/main" val="1150148038"/>
       </p:ext>
     </p:extLst>
   </p:cSld>
@@ -12948,12 +12956,19 @@
           </a:p>
           <a:p>
             <a:r>
-              <a:rPr lang="en-US" dirty="0">
-                <a:highlight>
-                  <a:srgbClr val="FFFF00"/>
-                </a:highlight>
-              </a:rPr>
+              <a:rPr lang="en-US" dirty="0"/>
               <a:t>Wednesday Session</a:t>
+            </a:r>
+          </a:p>
+          <a:p>
+            <a:pPr lvl="1">
+              <a:spcBef>
+                <a:spcPts val="0"/>
+              </a:spcBef>
+            </a:pPr>
+            <a:r>
+              <a:rPr lang="en-US" dirty="0"/>
+              <a:t>Won’t have one this week, but will talk through update 1 on Thursday</a:t>
             </a:r>
           </a:p>
           <a:p>
@@ -12980,7 +12995,7 @@
           <a:p>
             <a:r>
               <a:rPr lang="en-US" dirty="0"/>
-              <a:t>Monday: Project Update 2</a:t>
+              <a:t>Monday: Project Update 2 (will be posted on canvas soon)</a:t>
             </a:r>
           </a:p>
           <a:p>
@@ -13011,6 +13026,126 @@
 </file>
 
 <file path=ppt/slides/slide20.xml><?xml version="1.0" encoding="utf-8"?>
+<p:sld xmlns:a="http://schemas.openxmlformats.org/drawingml/2006/main" xmlns:r="http://schemas.openxmlformats.org/officeDocument/2006/relationships" xmlns:p="http://schemas.openxmlformats.org/presentationml/2006/main">
+  <p:cSld>
+    <p:spTree>
+      <p:nvGrpSpPr>
+        <p:cNvPr id="1" name=""/>
+        <p:cNvGrpSpPr/>
+        <p:nvPr/>
+      </p:nvGrpSpPr>
+      <p:grpSpPr>
+        <a:xfrm>
+          <a:off x="0" y="0"/>
+          <a:ext cx="0" cy="0"/>
+          <a:chOff x="0" y="0"/>
+          <a:chExt cx="0" cy="0"/>
+        </a:xfrm>
+      </p:grpSpPr>
+      <p:sp>
+        <p:nvSpPr>
+          <p:cNvPr id="2" name="Title 1">
+            <a:extLst>
+              <a:ext uri="{FF2B5EF4-FFF2-40B4-BE49-F238E27FC236}">
+                <a16:creationId xmlns:a16="http://schemas.microsoft.com/office/drawing/2014/main" id="{8A7AA672-F56C-2F41-B566-750991980C8A}"/>
+              </a:ext>
+            </a:extLst>
+          </p:cNvPr>
+          <p:cNvSpPr>
+            <a:spLocks noGrp="1"/>
+          </p:cNvSpPr>
+          <p:nvPr>
+            <p:ph type="title"/>
+          </p:nvPr>
+        </p:nvSpPr>
+        <p:spPr/>
+        <p:txBody>
+          <a:bodyPr/>
+          <a:lstStyle/>
+          <a:p>
+            <a:r>
+              <a:rPr lang="en-US" dirty="0"/>
+              <a:t>Some tips</a:t>
+            </a:r>
+          </a:p>
+        </p:txBody>
+      </p:sp>
+      <p:sp>
+        <p:nvSpPr>
+          <p:cNvPr id="3" name="Text Placeholder 2">
+            <a:extLst>
+              <a:ext uri="{FF2B5EF4-FFF2-40B4-BE49-F238E27FC236}">
+                <a16:creationId xmlns:a16="http://schemas.microsoft.com/office/drawing/2014/main" id="{95B2F8AE-4F06-1B49-B482-20CE10B4D010}"/>
+              </a:ext>
+            </a:extLst>
+          </p:cNvPr>
+          <p:cNvSpPr>
+            <a:spLocks noGrp="1"/>
+          </p:cNvSpPr>
+          <p:nvPr>
+            <p:ph type="body" idx="1"/>
+          </p:nvPr>
+        </p:nvSpPr>
+        <p:spPr/>
+        <p:txBody>
+          <a:bodyPr/>
+          <a:lstStyle/>
+          <a:p>
+            <a:r>
+              <a:rPr lang="en-US" dirty="0"/>
+              <a:t>Set up validation set(s) to match deployment scenarios (and constraints)</a:t>
+            </a:r>
+          </a:p>
+          <a:p>
+            <a:endParaRPr lang="en-US" dirty="0"/>
+          </a:p>
+          <a:p>
+            <a:r>
+              <a:rPr lang="en-US" dirty="0"/>
+              <a:t>Set up training set(s) any way we want but match data (both features and labels) available at training time</a:t>
+            </a:r>
+          </a:p>
+          <a:p>
+            <a:pPr lvl="1"/>
+            <a:r>
+              <a:rPr lang="en-US" dirty="0"/>
+              <a:t>Making sure labels are not censored based on label period</a:t>
+            </a:r>
+          </a:p>
+          <a:p>
+            <a:pPr lvl="1"/>
+            <a:r>
+              <a:rPr lang="en-US" dirty="0"/>
+              <a:t> Sampling (if helpful)</a:t>
+            </a:r>
+          </a:p>
+          <a:p>
+            <a:pPr lvl="1"/>
+            <a:r>
+              <a:rPr lang="en-US" dirty="0"/>
+              <a:t>Data collection and update lag</a:t>
+            </a:r>
+          </a:p>
+          <a:p>
+            <a:pPr lvl="1"/>
+            <a:endParaRPr lang="en-US" dirty="0"/>
+          </a:p>
+        </p:txBody>
+      </p:sp>
+    </p:spTree>
+    <p:extLst>
+      <p:ext uri="{BB962C8B-B14F-4D97-AF65-F5344CB8AC3E}">
+        <p14:creationId xmlns:p14="http://schemas.microsoft.com/office/powerpoint/2010/main" val="1150148038"/>
+      </p:ext>
+    </p:extLst>
+  </p:cSld>
+  <p:clrMapOvr>
+    <a:masterClrMapping/>
+  </p:clrMapOvr>
+</p:sld>
+</file>
+
+<file path=ppt/slides/slide21.xml><?xml version="1.0" encoding="utf-8"?>
 <p:sld xmlns:a="http://schemas.openxmlformats.org/drawingml/2006/main" xmlns:r="http://schemas.openxmlformats.org/officeDocument/2006/relationships" xmlns:p="http://schemas.openxmlformats.org/presentationml/2006/main">
   <p:cSld>
     <p:spTree>
@@ -13488,7 +13623,7 @@
 </p:sld>
 </file>
 
-<file path=ppt/slides/slide21.xml><?xml version="1.0" encoding="utf-8"?>
+<file path=ppt/slides/slide22.xml><?xml version="1.0" encoding="utf-8"?>
 <p:sld xmlns:a="http://schemas.openxmlformats.org/drawingml/2006/main" xmlns:r="http://schemas.openxmlformats.org/officeDocument/2006/relationships" xmlns:p="http://schemas.openxmlformats.org/presentationml/2006/main">
   <p:cSld>
     <p:spTree>
@@ -16121,7 +16256,7 @@
 </p:sld>
 </file>
 
-<file path=ppt/slides/slide22.xml><?xml version="1.0" encoding="utf-8"?>
+<file path=ppt/slides/slide23.xml><?xml version="1.0" encoding="utf-8"?>
 <p:sld xmlns:a="http://schemas.openxmlformats.org/drawingml/2006/main" xmlns:r="http://schemas.openxmlformats.org/officeDocument/2006/relationships" xmlns:p="http://schemas.openxmlformats.org/presentationml/2006/main">
   <p:cSld>
     <p:spTree>
@@ -17261,7 +17396,7 @@
 </p:sld>
 </file>
 
-<file path=ppt/slides/slide23.xml><?xml version="1.0" encoding="utf-8"?>
+<file path=ppt/slides/slide24.xml><?xml version="1.0" encoding="utf-8"?>
 <p:sld xmlns:a="http://schemas.openxmlformats.org/drawingml/2006/main" xmlns:r="http://schemas.openxmlformats.org/officeDocument/2006/relationships" xmlns:p="http://schemas.openxmlformats.org/presentationml/2006/main">
   <p:cSld>
     <p:spTree>
@@ -18400,7 +18535,7 @@
 </p:sld>
 </file>
 
-<file path=ppt/slides/slide24.xml><?xml version="1.0" encoding="utf-8"?>
+<file path=ppt/slides/slide25.xml><?xml version="1.0" encoding="utf-8"?>
 <p:sld xmlns:a="http://schemas.openxmlformats.org/drawingml/2006/main" xmlns:r="http://schemas.openxmlformats.org/officeDocument/2006/relationships" xmlns:p="http://schemas.openxmlformats.org/presentationml/2006/main">
   <p:cSld>
     <p:spTree>
@@ -19539,7 +19674,7 @@
 </p:sld>
 </file>
 
-<file path=ppt/slides/slide25.xml><?xml version="1.0" encoding="utf-8"?>
+<file path=ppt/slides/slide26.xml><?xml version="1.0" encoding="utf-8"?>
 <p:sld xmlns:a="http://schemas.openxmlformats.org/drawingml/2006/main" xmlns:r="http://schemas.openxmlformats.org/officeDocument/2006/relationships" xmlns:p="http://schemas.openxmlformats.org/presentationml/2006/main">
   <p:cSld>
     <p:spTree>
@@ -20678,7 +20813,7 @@
 </p:sld>
 </file>
 
-<file path=ppt/slides/slide26.xml><?xml version="1.0" encoding="utf-8"?>
+<file path=ppt/slides/slide27.xml><?xml version="1.0" encoding="utf-8"?>
 <p:sld xmlns:a="http://schemas.openxmlformats.org/drawingml/2006/main" xmlns:r="http://schemas.openxmlformats.org/officeDocument/2006/relationships" xmlns:p="http://schemas.openxmlformats.org/presentationml/2006/main">
   <p:cSld>
     <p:spTree>
@@ -21817,7 +21952,7 @@
 </p:sld>
 </file>
 
-<file path=ppt/slides/slide27.xml><?xml version="1.0" encoding="utf-8"?>
+<file path=ppt/slides/slide28.xml><?xml version="1.0" encoding="utf-8"?>
 <p:sld xmlns:a="http://schemas.openxmlformats.org/drawingml/2006/main" xmlns:r="http://schemas.openxmlformats.org/officeDocument/2006/relationships" xmlns:p="http://schemas.openxmlformats.org/presentationml/2006/main">
   <p:cSld>
     <p:spTree>
@@ -23230,7 +23365,7 @@
 </p:sld>
 </file>
 
-<file path=ppt/slides/slide28.xml><?xml version="1.0" encoding="utf-8"?>
+<file path=ppt/slides/slide29.xml><?xml version="1.0" encoding="utf-8"?>
 <p:sld xmlns:a="http://schemas.openxmlformats.org/drawingml/2006/main" xmlns:r="http://schemas.openxmlformats.org/officeDocument/2006/relationships" xmlns:p="http://schemas.openxmlformats.org/presentationml/2006/main">
   <p:cSld>
     <p:spTree>
@@ -24051,7 +24186,161 @@
 </p:sld>
 </file>
 
-<file path=ppt/slides/slide29.xml><?xml version="1.0" encoding="utf-8"?>
+<file path=ppt/slides/slide3.xml><?xml version="1.0" encoding="utf-8"?>
+<p:sld xmlns:a="http://schemas.openxmlformats.org/drawingml/2006/main" xmlns:r="http://schemas.openxmlformats.org/officeDocument/2006/relationships" xmlns:p="http://schemas.openxmlformats.org/presentationml/2006/main">
+  <p:cSld>
+    <p:spTree>
+      <p:nvGrpSpPr>
+        <p:cNvPr id="1" name=""/>
+        <p:cNvGrpSpPr/>
+        <p:nvPr/>
+      </p:nvGrpSpPr>
+      <p:grpSpPr>
+        <a:xfrm>
+          <a:off x="0" y="0"/>
+          <a:ext cx="0" cy="0"/>
+          <a:chOff x="0" y="0"/>
+          <a:chExt cx="0" cy="0"/>
+        </a:xfrm>
+      </p:grpSpPr>
+      <p:sp>
+        <p:nvSpPr>
+          <p:cNvPr id="3" name="Title 2">
+            <a:extLst>
+              <a:ext uri="{FF2B5EF4-FFF2-40B4-BE49-F238E27FC236}">
+                <a16:creationId xmlns:a16="http://schemas.microsoft.com/office/drawing/2014/main" id="{9323871C-7CA8-1448-8FFC-1AE6E1838941}"/>
+              </a:ext>
+            </a:extLst>
+          </p:cNvPr>
+          <p:cNvSpPr>
+            <a:spLocks noGrp="1"/>
+          </p:cNvSpPr>
+          <p:nvPr>
+            <p:ph type="title"/>
+          </p:nvPr>
+        </p:nvSpPr>
+        <p:spPr/>
+        <p:txBody>
+          <a:bodyPr/>
+          <a:lstStyle/>
+          <a:p>
+            <a:r>
+              <a:rPr lang="en-US" dirty="0"/>
+              <a:t>Reminder: Office Hours</a:t>
+            </a:r>
+          </a:p>
+        </p:txBody>
+      </p:sp>
+      <p:sp>
+        <p:nvSpPr>
+          <p:cNvPr id="4" name="Text Placeholder 3">
+            <a:extLst>
+              <a:ext uri="{FF2B5EF4-FFF2-40B4-BE49-F238E27FC236}">
+                <a16:creationId xmlns:a16="http://schemas.microsoft.com/office/drawing/2014/main" id="{5E600BA7-FA45-884F-9820-9E5F2CB7AA48}"/>
+              </a:ext>
+            </a:extLst>
+          </p:cNvPr>
+          <p:cNvSpPr>
+            <a:spLocks noGrp="1"/>
+          </p:cNvSpPr>
+          <p:nvPr>
+            <p:ph type="body" idx="1"/>
+          </p:nvPr>
+        </p:nvSpPr>
+        <p:spPr/>
+        <p:txBody>
+          <a:bodyPr/>
+          <a:lstStyle/>
+          <a:p>
+            <a:pPr marL="76200" indent="0">
+              <a:buNone/>
+            </a:pPr>
+            <a:r>
+              <a:rPr lang="en-US" i="1" dirty="0"/>
+              <a:t>Instructor Office Hours (course content, general questions, </a:t>
+            </a:r>
+            <a:r>
+              <a:rPr lang="en-US" i="1" dirty="0" err="1"/>
+              <a:t>etc</a:t>
+            </a:r>
+            <a:r>
+              <a:rPr lang="en-US" i="1" dirty="0"/>
+              <a:t>)</a:t>
+            </a:r>
+            <a:endParaRPr lang="en-US" dirty="0"/>
+          </a:p>
+          <a:p>
+            <a:pPr lvl="1"/>
+            <a:r>
+              <a:rPr lang="en-US" sz="2400" dirty="0" err="1"/>
+              <a:t>Rayid</a:t>
+            </a:r>
+            <a:r>
+              <a:rPr lang="en-US" sz="2400" dirty="0"/>
+              <a:t> (in GHC 8023): Tuesdays 12-1, Wednesdays 2-3</a:t>
+            </a:r>
+          </a:p>
+          <a:p>
+            <a:pPr lvl="1"/>
+            <a:r>
+              <a:rPr lang="en-US" sz="2400" dirty="0"/>
+              <a:t>Kit (in GHC 8018): Wednesdays 11-12, Thursdays 12-1</a:t>
+            </a:r>
+            <a:endParaRPr lang="en-US" dirty="0"/>
+          </a:p>
+          <a:p>
+            <a:pPr marL="76200" indent="0">
+              <a:buNone/>
+            </a:pPr>
+            <a:endParaRPr lang="en-US" i="1" dirty="0"/>
+          </a:p>
+          <a:p>
+            <a:pPr marL="76200" indent="0">
+              <a:buNone/>
+            </a:pPr>
+            <a:r>
+              <a:rPr lang="en-US" i="1" dirty="0"/>
+              <a:t>Infrastructure and Tech Setup Office Hours with the TAs:</a:t>
+            </a:r>
+            <a:endParaRPr lang="en-US" dirty="0"/>
+          </a:p>
+          <a:p>
+            <a:pPr lvl="1"/>
+            <a:r>
+              <a:rPr lang="en-US" sz="2400" dirty="0"/>
+              <a:t>Riyaz (8th floor GHC, by printers): Mondays 12-1, Fridays 10-11</a:t>
+            </a:r>
+          </a:p>
+          <a:p>
+            <a:pPr lvl="1"/>
+            <a:r>
+              <a:rPr lang="en-US" sz="2400" dirty="0"/>
+              <a:t>Abhishek (8th floor GHC, by printers): Mondays 11-12, Fridays 2-3</a:t>
+            </a:r>
+            <a:endParaRPr lang="en-US" dirty="0"/>
+          </a:p>
+          <a:p>
+            <a:pPr marL="76200" indent="0">
+              <a:buNone/>
+            </a:pPr>
+            <a:endParaRPr lang="en-US" dirty="0"/>
+          </a:p>
+        </p:txBody>
+      </p:sp>
+    </p:spTree>
+    <p:extLst>
+      <p:ext uri="{BB962C8B-B14F-4D97-AF65-F5344CB8AC3E}">
+        <p14:creationId xmlns:p14="http://schemas.microsoft.com/office/powerpoint/2010/main" val="1285932549"/>
+      </p:ext>
+    </p:extLst>
+  </p:cSld>
+  <p:clrMapOvr>
+    <a:masterClrMapping/>
+  </p:clrMapOvr>
+</p:sld>
+</file>
+
+<file path=ppt/slides/slide30.xml><?xml version="1.0" encoding="utf-8"?>
 <p:sld xmlns:a="http://schemas.openxmlformats.org/drawingml/2006/main" xmlns:r="http://schemas.openxmlformats.org/officeDocument/2006/relationships" xmlns:p="http://schemas.openxmlformats.org/presentationml/2006/main">
   <p:cSld>
     <p:spTree>
@@ -24214,7 +24503,7 @@
 </p:sld>
 </file>
 
-<file path=ppt/slides/slide3.xml><?xml version="1.0" encoding="utf-8"?>
+<file path=ppt/slides/slide4.xml><?xml version="1.0" encoding="utf-8"?>
 <p:sld xmlns:a="http://schemas.openxmlformats.org/drawingml/2006/main" xmlns:r="http://schemas.openxmlformats.org/officeDocument/2006/relationships" xmlns:p="http://schemas.openxmlformats.org/presentationml/2006/main">
   <p:cSld>
     <p:spTree>
@@ -24345,146 +24634,7 @@
 </p:sld>
 </file>
 
-<file path=ppt/slides/slide30.xml><?xml version="1.0" encoding="utf-8"?>
-<p:sld xmlns:a="http://schemas.openxmlformats.org/drawingml/2006/main" xmlns:r="http://schemas.openxmlformats.org/officeDocument/2006/relationships" xmlns:p="http://schemas.openxmlformats.org/presentationml/2006/main">
-  <p:cSld>
-    <p:spTree>
-      <p:nvGrpSpPr>
-        <p:cNvPr id="1" name=""/>
-        <p:cNvGrpSpPr/>
-        <p:nvPr/>
-      </p:nvGrpSpPr>
-      <p:grpSpPr>
-        <a:xfrm>
-          <a:off x="0" y="0"/>
-          <a:ext cx="0" cy="0"/>
-          <a:chOff x="0" y="0"/>
-          <a:chExt cx="0" cy="0"/>
-        </a:xfrm>
-      </p:grpSpPr>
-      <p:sp>
-        <p:nvSpPr>
-          <p:cNvPr id="3" name="Title 2">
-            <a:extLst>
-              <a:ext uri="{FF2B5EF4-FFF2-40B4-BE49-F238E27FC236}">
-                <a16:creationId xmlns:a16="http://schemas.microsoft.com/office/drawing/2014/main" id="{9323871C-7CA8-1448-8FFC-1AE6E1838941}"/>
-              </a:ext>
-            </a:extLst>
-          </p:cNvPr>
-          <p:cNvSpPr>
-            <a:spLocks noGrp="1"/>
-          </p:cNvSpPr>
-          <p:nvPr>
-            <p:ph type="title"/>
-          </p:nvPr>
-        </p:nvSpPr>
-        <p:spPr/>
-        <p:txBody>
-          <a:bodyPr/>
-          <a:lstStyle/>
-          <a:p>
-            <a:r>
-              <a:rPr lang="en-US" dirty="0"/>
-              <a:t>Reminders</a:t>
-            </a:r>
-          </a:p>
-        </p:txBody>
-      </p:sp>
-      <p:sp>
-        <p:nvSpPr>
-          <p:cNvPr id="5" name="Text Placeholder 4">
-            <a:extLst>
-              <a:ext uri="{FF2B5EF4-FFF2-40B4-BE49-F238E27FC236}">
-                <a16:creationId xmlns:a16="http://schemas.microsoft.com/office/drawing/2014/main" id="{F4E0A5F0-1D89-954D-91FB-596CD9E690F2}"/>
-              </a:ext>
-            </a:extLst>
-          </p:cNvPr>
-          <p:cNvSpPr>
-            <a:spLocks noGrp="1"/>
-          </p:cNvSpPr>
-          <p:nvPr>
-            <p:ph type="body" idx="1"/>
-          </p:nvPr>
-        </p:nvSpPr>
-        <p:spPr/>
-        <p:txBody>
-          <a:bodyPr/>
-          <a:lstStyle/>
-          <a:p>
-            <a:pPr marL="76200" indent="0">
-              <a:buNone/>
-            </a:pPr>
-            <a:r>
-              <a:rPr lang="en-US" b="1" dirty="0"/>
-              <a:t>This week:</a:t>
-            </a:r>
-            <a:endParaRPr lang="en-US" dirty="0"/>
-          </a:p>
-          <a:p>
-            <a:r>
-              <a:rPr lang="en-US" dirty="0">
-                <a:highlight>
-                  <a:srgbClr val="FFFF00"/>
-                </a:highlight>
-              </a:rPr>
-              <a:t>Wednesday Session</a:t>
-            </a:r>
-          </a:p>
-          <a:p>
-            <a:r>
-              <a:rPr lang="en-US" dirty="0"/>
-              <a:t>Reading for Thursday: Cross-Validation Strategies</a:t>
-            </a:r>
-          </a:p>
-          <a:p>
-            <a:pPr marL="76200" indent="0">
-              <a:buNone/>
-            </a:pPr>
-            <a:endParaRPr lang="en-US" dirty="0"/>
-          </a:p>
-          <a:p>
-            <a:pPr marL="76200" indent="0">
-              <a:buNone/>
-            </a:pPr>
-            <a:r>
-              <a:rPr lang="en-US" b="1" dirty="0"/>
-              <a:t>Coming up next week:</a:t>
-            </a:r>
-          </a:p>
-          <a:p>
-            <a:r>
-              <a:rPr lang="en-US" dirty="0"/>
-              <a:t>Monday: Project Update 2</a:t>
-            </a:r>
-          </a:p>
-          <a:p>
-            <a:r>
-              <a:rPr lang="en-US" dirty="0"/>
-              <a:t>Tuesday: Weekly Feedback Form</a:t>
-            </a:r>
-          </a:p>
-          <a:p>
-            <a:pPr marL="76200" indent="0">
-              <a:buNone/>
-            </a:pPr>
-            <a:endParaRPr lang="en-US" dirty="0"/>
-          </a:p>
-        </p:txBody>
-      </p:sp>
-    </p:spTree>
-    <p:extLst>
-      <p:ext uri="{BB962C8B-B14F-4D97-AF65-F5344CB8AC3E}">
-        <p14:creationId xmlns:p14="http://schemas.microsoft.com/office/powerpoint/2010/main" val="3482194065"/>
-      </p:ext>
-    </p:extLst>
-  </p:cSld>
-  <p:clrMapOvr>
-    <a:masterClrMapping/>
-  </p:clrMapOvr>
-</p:sld>
-</file>
-
-<file path=ppt/slides/slide4.xml><?xml version="1.0" encoding="utf-8"?>
+<file path=ppt/slides/slide5.xml><?xml version="1.0" encoding="utf-8"?>
 <p:sld xmlns:a="http://schemas.openxmlformats.org/drawingml/2006/main" xmlns:r="http://schemas.openxmlformats.org/officeDocument/2006/relationships" xmlns:p="http://schemas.openxmlformats.org/presentationml/2006/main">
   <p:cSld>
     <p:spTree>
@@ -24613,7 +24763,7 @@
 </p:sld>
 </file>
 
-<file path=ppt/slides/slide5.xml><?xml version="1.0" encoding="utf-8"?>
+<file path=ppt/slides/slide6.xml><?xml version="1.0" encoding="utf-8"?>
 <p:sld xmlns:a="http://schemas.openxmlformats.org/drawingml/2006/main" xmlns:r="http://schemas.openxmlformats.org/officeDocument/2006/relationships" xmlns:p="http://schemas.openxmlformats.org/presentationml/2006/main">
   <p:cSld>
     <p:spTree>
@@ -24723,7 +24873,7 @@
 </p:sld>
 </file>
 
-<file path=ppt/slides/slide6.xml><?xml version="1.0" encoding="utf-8"?>
+<file path=ppt/slides/slide7.xml><?xml version="1.0" encoding="utf-8"?>
 <p:sld xmlns:a="http://schemas.openxmlformats.org/drawingml/2006/main" xmlns:r="http://schemas.openxmlformats.org/officeDocument/2006/relationships" xmlns:p="http://schemas.openxmlformats.org/presentationml/2006/main">
   <p:cSld>
     <p:spTree>
@@ -24806,7 +24956,7 @@
 </p:sld>
 </file>
 
-<file path=ppt/slides/slide7.xml><?xml version="1.0" encoding="utf-8"?>
+<file path=ppt/slides/slide8.xml><?xml version="1.0" encoding="utf-8"?>
 <p:sld xmlns:a="http://schemas.openxmlformats.org/drawingml/2006/main" xmlns:r="http://schemas.openxmlformats.org/officeDocument/2006/relationships" xmlns:p="http://schemas.openxmlformats.org/presentationml/2006/main">
   <p:cSld>
     <p:spTree>
@@ -24904,101 +25054,6 @@
   <p:clrMapOvr>
     <a:masterClrMapping/>
   </p:clrMapOvr>
-</p:sld>
-</file>
-
-<file path=ppt/slides/slide8.xml><?xml version="1.0" encoding="utf-8"?>
-<p:sld xmlns:a="http://schemas.openxmlformats.org/drawingml/2006/main" xmlns:r="http://schemas.openxmlformats.org/officeDocument/2006/relationships" xmlns:p="http://schemas.openxmlformats.org/presentationml/2006/main">
-  <p:cSld>
-    <p:spTree>
-      <p:nvGrpSpPr>
-        <p:cNvPr id="1" name=""/>
-        <p:cNvGrpSpPr/>
-        <p:nvPr/>
-      </p:nvGrpSpPr>
-      <p:grpSpPr>
-        <a:xfrm>
-          <a:off x="0" y="0"/>
-          <a:ext cx="0" cy="0"/>
-          <a:chOff x="0" y="0"/>
-          <a:chExt cx="0" cy="0"/>
-        </a:xfrm>
-      </p:grpSpPr>
-      <p:sp>
-        <p:nvSpPr>
-          <p:cNvPr id="4" name="Title 3">
-            <a:extLst>
-              <a:ext uri="{FF2B5EF4-FFF2-40B4-BE49-F238E27FC236}">
-                <a16:creationId xmlns:a16="http://schemas.microsoft.com/office/drawing/2014/main" id="{30C2C959-72F2-EF4D-80DA-F48A29D0F3C4}"/>
-              </a:ext>
-            </a:extLst>
-          </p:cNvPr>
-          <p:cNvSpPr>
-            <a:spLocks noGrp="1"/>
-          </p:cNvSpPr>
-          <p:nvPr>
-            <p:ph type="title"/>
-          </p:nvPr>
-        </p:nvSpPr>
-        <p:spPr/>
-        <p:txBody>
-          <a:bodyPr/>
-          <a:lstStyle/>
-          <a:p>
-            <a:r>
-              <a:rPr lang="en-US" dirty="0"/>
-              <a:t>What do we need our selected model to do?</a:t>
-            </a:r>
-          </a:p>
-        </p:txBody>
-      </p:sp>
-      <p:sp>
-        <p:nvSpPr>
-          <p:cNvPr id="3" name="Text Placeholder 2">
-            <a:extLst>
-              <a:ext uri="{FF2B5EF4-FFF2-40B4-BE49-F238E27FC236}">
-                <a16:creationId xmlns:a16="http://schemas.microsoft.com/office/drawing/2014/main" id="{DA13BAFF-48B6-9046-94F3-CBF50B2F21D8}"/>
-              </a:ext>
-            </a:extLst>
-          </p:cNvPr>
-          <p:cNvSpPr>
-            <a:spLocks noGrp="1"/>
-          </p:cNvSpPr>
-          <p:nvPr>
-            <p:ph type="body" idx="1"/>
-          </p:nvPr>
-        </p:nvSpPr>
-        <p:spPr/>
-        <p:txBody>
-          <a:bodyPr/>
-          <a:lstStyle/>
-          <a:p>
-            <a:endParaRPr lang="en-US"/>
-          </a:p>
-        </p:txBody>
-      </p:sp>
-    </p:spTree>
-    <p:extLst>
-      <p:ext uri="{BB962C8B-B14F-4D97-AF65-F5344CB8AC3E}">
-        <p14:creationId xmlns:p14="http://schemas.microsoft.com/office/powerpoint/2010/main" val="106807354"/>
-      </p:ext>
-    </p:extLst>
-  </p:cSld>
-  <p:clrMapOvr>
-    <a:masterClrMapping/>
-  </p:clrMapOvr>
-  <mc:AlternateContent xmlns:mc="http://schemas.openxmlformats.org/markup-compatibility/2006" xmlns:p14="http://schemas.microsoft.com/office/powerpoint/2010/main">
-    <mc:Choice Requires="p14">
-      <p:transition spd="med" p14:dur="700">
-        <p:fade/>
-      </p:transition>
-    </mc:Choice>
-    <mc:Fallback xmlns="">
-      <p:transition spd="med">
-        <p:fade/>
-      </p:transition>
-    </mc:Fallback>
-  </mc:AlternateContent>
 </p:sld>
 </file>
 
@@ -25049,10 +25104,10 @@
       </p:sp>
       <p:sp>
         <p:nvSpPr>
-          <p:cNvPr id="5" name="Text Placeholder 4">
+          <p:cNvPr id="3" name="Text Placeholder 2">
             <a:extLst>
               <a:ext uri="{FF2B5EF4-FFF2-40B4-BE49-F238E27FC236}">
-                <a16:creationId xmlns:a16="http://schemas.microsoft.com/office/drawing/2014/main" id="{24A75FF1-9EFE-0F41-92F5-3E749CFB2EB5}"/>
+                <a16:creationId xmlns:a16="http://schemas.microsoft.com/office/drawing/2014/main" id="{DA13BAFF-48B6-9046-94F3-CBF50B2F21D8}"/>
               </a:ext>
             </a:extLst>
           </p:cNvPr>
@@ -25068,47 +25123,14 @@
           <a:bodyPr/>
           <a:lstStyle/>
           <a:p>
-            <a:r>
-              <a:rPr lang="en-US" dirty="0"/>
-              <a:t>Perform well</a:t>
-            </a:r>
-          </a:p>
-          <a:p>
-            <a:pPr lvl="1"/>
-            <a:r>
-              <a:rPr lang="en-US" dirty="0"/>
-              <a:t>What metric?</a:t>
-            </a:r>
-          </a:p>
-          <a:p>
-            <a:pPr lvl="1"/>
-            <a:r>
-              <a:rPr lang="en-US" dirty="0"/>
-              <a:t>Compared to what?</a:t>
-            </a:r>
-          </a:p>
-          <a:p>
-            <a:endParaRPr lang="en-US" dirty="0"/>
-          </a:p>
-          <a:p>
-            <a:r>
-              <a:rPr lang="en-US" dirty="0"/>
-              <a:t>Generalize</a:t>
-            </a:r>
-          </a:p>
-          <a:p>
-            <a:pPr lvl="1"/>
-            <a:r>
-              <a:rPr lang="en-US" dirty="0"/>
-              <a:t>To what?</a:t>
-            </a:r>
+            <a:endParaRPr lang="en-US"/>
           </a:p>
         </p:txBody>
       </p:sp>
     </p:spTree>
     <p:extLst>
       <p:ext uri="{BB962C8B-B14F-4D97-AF65-F5344CB8AC3E}">
-        <p14:creationId xmlns:p14="http://schemas.microsoft.com/office/powerpoint/2010/main" val="4111643116"/>
+        <p14:creationId xmlns:p14="http://schemas.microsoft.com/office/powerpoint/2010/main" val="106807354"/>
       </p:ext>
     </p:extLst>
   </p:cSld>

</xml_diff>